<commit_message>
Adding miniq testing presentation
</commit_message>
<xml_diff>
--- a/MicroservicesITWeek.pptx
+++ b/MicroservicesITWeek.pptx
@@ -155,7 +155,7 @@
   </p:defaultTextStyle>
   <p:extLst>
     <p:ext uri="{EFAFB233-063F-42B5-8137-9DF3F51BA10A}">
-      <p15:sldGuideLst xmlns:p15="http://schemas.microsoft.com/office/powerpoint/2012/main" xmlns="">
+      <p15:sldGuideLst xmlns="" xmlns:p15="http://schemas.microsoft.com/office/powerpoint/2012/main">
         <p15:guide id="1" orient="horz" pos="373">
           <p15:clr>
             <a:srgbClr val="A4A3A4"/>
@@ -337,7 +337,7 @@
           <a:p>
             <a:fld id="{7F5E9BF7-95E4-A242-BA1D-05FDCF603BE6}" type="datetime1">
               <a:rPr lang="en-US" smtClean="0"/>
-              <a:t>3/29/2016</a:t>
+              <a:t>4/4/2016</a:t>
             </a:fld>
             <a:endParaRPr lang="en-US"/>
           </a:p>
@@ -503,7 +503,7 @@
           <a:p>
             <a:fld id="{165DBCB1-0306-AD41-9452-11E7C08D5C04}" type="datetime1">
               <a:rPr lang="en-US" smtClean="0"/>
-              <a:t>3/29/2016</a:t>
+              <a:t>4/4/2016</a:t>
             </a:fld>
             <a:endParaRPr lang="en-US"/>
           </a:p>
@@ -817,22 +817,28 @@
           <a:lstStyle/>
           <a:p>
             <a:r>
-              <a:rPr lang="ru-RU" dirty="0" smtClean="0"/>
-              <a:t>Добрый день.</a:t>
-            </a:r>
-          </a:p>
-          <a:p>
-            <a:r>
-              <a:rPr lang="ru-RU" dirty="0" smtClean="0"/>
-              <a:t>Меня зовут Виталий. И сегодня мы поговорим о таком</a:t>
-            </a:r>
-            <a:r>
-              <a:rPr lang="ru-RU" baseline="0" dirty="0" smtClean="0"/>
-              <a:t> подходе к построению архитектуры как </a:t>
-            </a:r>
-            <a:r>
-              <a:rPr lang="ru-RU" baseline="0" dirty="0" err="1" smtClean="0"/>
-              <a:t>микросервисы</a:t>
+              <a:rPr lang="en-US" dirty="0" smtClean="0"/>
+              <a:t>Hi,</a:t>
+            </a:r>
+            <a:r>
+              <a:rPr lang="en-US" baseline="0" dirty="0" smtClean="0"/>
+              <a:t> My name is </a:t>
+            </a:r>
+            <a:r>
+              <a:rPr lang="en-US" baseline="0" dirty="0" err="1" smtClean="0"/>
+              <a:t>Vitali</a:t>
+            </a:r>
+            <a:r>
+              <a:rPr lang="en-US" baseline="0" dirty="0" smtClean="0"/>
+              <a:t> and today we’ll talk about </a:t>
+            </a:r>
+            <a:r>
+              <a:rPr lang="en-US" baseline="0" dirty="0" err="1" smtClean="0"/>
+              <a:t>microservices</a:t>
+            </a:r>
+            <a:r>
+              <a:rPr lang="en-US" baseline="0" dirty="0" smtClean="0"/>
+              <a:t> application architecture</a:t>
             </a:r>
             <a:endParaRPr lang="ru-RU" dirty="0" smtClean="0"/>
           </a:p>
@@ -3834,68 +3840,109 @@
               <a:defRPr/>
             </a:pPr>
             <a:r>
-              <a:rPr lang="ru-RU" dirty="0" smtClean="0"/>
-              <a:t>Итак, что же такое </a:t>
-            </a:r>
-            <a:r>
-              <a:rPr lang="ru-RU" dirty="0" err="1" smtClean="0"/>
-              <a:t>микросервисы</a:t>
+              <a:rPr lang="en-US" dirty="0" smtClean="0"/>
+              <a:t>So what are </a:t>
+            </a:r>
+            <a:r>
+              <a:rPr lang="en-US" dirty="0" err="1" smtClean="0"/>
+              <a:t>microservices</a:t>
             </a:r>
             <a:r>
               <a:rPr lang="ru-RU" dirty="0" smtClean="0"/>
               <a:t>? </a:t>
             </a:r>
-          </a:p>
-          <a:p>
-            <a:r>
-              <a:rPr lang="ru-RU" dirty="0" smtClean="0"/>
-              <a:t>Традиционно </a:t>
+            <a:endParaRPr lang="en-US" dirty="0" smtClean="0"/>
+          </a:p>
+          <a:p>
+            <a:pPr marL="0" marR="0" indent="0" algn="l" defTabSz="457200" rtl="0" eaLnBrk="1" fontAlgn="auto" latinLnBrk="0" hangingPunct="1">
+              <a:lnSpc>
+                <a:spcPct val="100000"/>
+              </a:lnSpc>
+              <a:spcBef>
+                <a:spcPts val="0"/>
+              </a:spcBef>
+              <a:spcAft>
+                <a:spcPts val="0"/>
+              </a:spcAft>
+              <a:buClrTx/>
+              <a:buSzTx/>
+              <a:buFontTx/>
+              <a:buNone/>
+              <a:tabLst/>
+              <a:defRPr/>
+            </a:pPr>
+            <a:r>
+              <a:rPr lang="en-US" dirty="0" smtClean="0"/>
+              <a:t>With traditional</a:t>
+            </a:r>
+            <a:r>
+              <a:rPr lang="en-US" baseline="0" dirty="0" smtClean="0"/>
+              <a:t> approach the whole system, whole implemented logic is packed as one big application. Such application is called monolithic because it is developed, released and deployed as a whole</a:t>
             </a:r>
             <a:r>
               <a:rPr lang="ru-RU" baseline="0" dirty="0" smtClean="0"/>
-              <a:t>вся реализуемая система, вся логика упаковывается в одно большое приложение. Такое приложение называется монолитным, потому что разрабатывается, выпускается и </a:t>
-            </a:r>
-            <a:r>
-              <a:rPr lang="ru-RU" baseline="0" dirty="0" err="1" smtClean="0"/>
-              <a:t>деплоится</a:t>
-            </a:r>
-            <a:r>
-              <a:rPr lang="ru-RU" baseline="0" dirty="0" smtClean="0"/>
-              <a:t> оно единым целым.</a:t>
-            </a:r>
-          </a:p>
-          <a:p>
-            <a:r>
-              <a:rPr lang="ru-RU" baseline="0" dirty="0" smtClean="0"/>
-              <a:t>При </a:t>
-            </a:r>
-            <a:r>
-              <a:rPr lang="ru-RU" baseline="0" dirty="0" err="1" smtClean="0"/>
-              <a:t>микросервисном</a:t>
-            </a:r>
-            <a:r>
-              <a:rPr lang="ru-RU" baseline="0" dirty="0" smtClean="0"/>
-              <a:t> подходе, напротив, вся система представляет собой набор сервисов, которые достаточно слабо связаны друг с другом и потому могут разрабатываться и </a:t>
-            </a:r>
-            <a:r>
-              <a:rPr lang="ru-RU" baseline="0" dirty="0" err="1" smtClean="0"/>
-              <a:t>деплоиться</a:t>
-            </a:r>
-            <a:r>
-              <a:rPr lang="ru-RU" baseline="0" dirty="0" smtClean="0"/>
-              <a:t> отдельно друг от друга.</a:t>
-            </a:r>
-            <a:endParaRPr lang="ru-RU" dirty="0" smtClean="0"/>
-          </a:p>
-          <a:p>
-            <a:r>
-              <a:rPr lang="ru-RU" dirty="0" smtClean="0"/>
-              <a:t>Этот подход к архитектуре формировался и</a:t>
-            </a:r>
-            <a:r>
-              <a:rPr lang="ru-RU" baseline="0" dirty="0" smtClean="0"/>
-              <a:t> применялся в том или ином виде на продолжении многих лет, но более-менее подробно был описан сравнительно недавно.</a:t>
-            </a:r>
+              <a:t>.</a:t>
+            </a:r>
+            <a:endParaRPr lang="en-US" baseline="0" dirty="0" smtClean="0"/>
+          </a:p>
+          <a:p>
+            <a:pPr marL="0" marR="0" indent="0" algn="l" defTabSz="457200" rtl="0" eaLnBrk="1" fontAlgn="auto" latinLnBrk="0" hangingPunct="1">
+              <a:lnSpc>
+                <a:spcPct val="100000"/>
+              </a:lnSpc>
+              <a:spcBef>
+                <a:spcPts val="0"/>
+              </a:spcBef>
+              <a:spcAft>
+                <a:spcPts val="0"/>
+              </a:spcAft>
+              <a:buClrTx/>
+              <a:buSzTx/>
+              <a:buFontTx/>
+              <a:buNone/>
+              <a:tabLst/>
+              <a:defRPr/>
+            </a:pPr>
+            <a:r>
+              <a:rPr lang="en-US" baseline="0" dirty="0" smtClean="0"/>
+              <a:t>With </a:t>
+            </a:r>
+            <a:r>
+              <a:rPr lang="en-US" baseline="0" dirty="0" err="1" smtClean="0"/>
+              <a:t>microservices</a:t>
+            </a:r>
+            <a:r>
+              <a:rPr lang="en-US" baseline="0" dirty="0" smtClean="0"/>
+              <a:t> architecture, on the contrary, the system is represented as set of services that are loosely coupled together and thus can be developed and deployed separately.</a:t>
+            </a:r>
+          </a:p>
+          <a:p>
+            <a:pPr marL="0" marR="0" indent="0" algn="l" defTabSz="457200" rtl="0" eaLnBrk="1" fontAlgn="auto" latinLnBrk="0" hangingPunct="1">
+              <a:lnSpc>
+                <a:spcPct val="100000"/>
+              </a:lnSpc>
+              <a:spcBef>
+                <a:spcPts val="0"/>
+              </a:spcBef>
+              <a:spcAft>
+                <a:spcPts val="0"/>
+              </a:spcAft>
+              <a:buClrTx/>
+              <a:buSzTx/>
+              <a:buFontTx/>
+              <a:buNone/>
+              <a:tabLst/>
+              <a:defRPr/>
+            </a:pPr>
+            <a:r>
+              <a:rPr lang="en-US" baseline="0" dirty="0" smtClean="0"/>
+              <a:t>This approach to application architecture has been formed and applied for many years in some forms, but was described in details more-less </a:t>
+            </a:r>
+            <a:r>
+              <a:rPr lang="en-US" baseline="0" smtClean="0"/>
+              <a:t>recently.</a:t>
+            </a:r>
+            <a:endParaRPr lang="ru-RU" baseline="0" dirty="0" smtClean="0"/>
           </a:p>
         </p:txBody>
       </p:sp>
@@ -12941,7 +12988,7 @@
           <a:p>
             <a:fld id="{BA1EE60E-2D75-4960-8A8D-4E97DBD789C3}" type="datetimeFigureOut">
               <a:rPr lang="ru-RU" smtClean="0"/>
-              <a:t>29.03.2016</a:t>
+              <a:t>04.04.2016</a:t>
             </a:fld>
             <a:endParaRPr lang="ru-RU"/>
           </a:p>
@@ -13809,7 +13856,7 @@
           <a:p>
             <a:fld id="{BA1EE60E-2D75-4960-8A8D-4E97DBD789C3}" type="datetimeFigureOut">
               <a:rPr lang="ru-RU" smtClean="0"/>
-              <a:t>29.03.2016</a:t>
+              <a:t>04.04.2016</a:t>
             </a:fld>
             <a:endParaRPr lang="ru-RU"/>
           </a:p>
@@ -14055,7 +14102,7 @@
           <a:p>
             <a:fld id="{BA1EE60E-2D75-4960-8A8D-4E97DBD789C3}" type="datetimeFigureOut">
               <a:rPr lang="ru-RU" smtClean="0"/>
-              <a:t>29.03.2016</a:t>
+              <a:t>04.04.2016</a:t>
             </a:fld>
             <a:endParaRPr lang="ru-RU"/>
           </a:p>
@@ -14343,7 +14390,7 @@
           <a:p>
             <a:fld id="{BA1EE60E-2D75-4960-8A8D-4E97DBD789C3}" type="datetimeFigureOut">
               <a:rPr lang="ru-RU" smtClean="0"/>
-              <a:t>29.03.2016</a:t>
+              <a:t>04.04.2016</a:t>
             </a:fld>
             <a:endParaRPr lang="ru-RU"/>
           </a:p>
@@ -14765,7 +14812,7 @@
           <a:p>
             <a:fld id="{BA1EE60E-2D75-4960-8A8D-4E97DBD789C3}" type="datetimeFigureOut">
               <a:rPr lang="ru-RU" smtClean="0"/>
-              <a:t>29.03.2016</a:t>
+              <a:t>04.04.2016</a:t>
             </a:fld>
             <a:endParaRPr lang="ru-RU"/>
           </a:p>
@@ -14883,7 +14930,7 @@
           <a:p>
             <a:fld id="{BA1EE60E-2D75-4960-8A8D-4E97DBD789C3}" type="datetimeFigureOut">
               <a:rPr lang="ru-RU" smtClean="0"/>
-              <a:t>29.03.2016</a:t>
+              <a:t>04.04.2016</a:t>
             </a:fld>
             <a:endParaRPr lang="ru-RU"/>
           </a:p>
@@ -14978,7 +15025,7 @@
           <a:p>
             <a:fld id="{BA1EE60E-2D75-4960-8A8D-4E97DBD789C3}" type="datetimeFigureOut">
               <a:rPr lang="ru-RU" smtClean="0"/>
-              <a:t>29.03.2016</a:t>
+              <a:t>04.04.2016</a:t>
             </a:fld>
             <a:endParaRPr lang="ru-RU"/>
           </a:p>
@@ -15255,7 +15302,7 @@
           <a:p>
             <a:fld id="{BA1EE60E-2D75-4960-8A8D-4E97DBD789C3}" type="datetimeFigureOut">
               <a:rPr lang="ru-RU" smtClean="0"/>
-              <a:t>29.03.2016</a:t>
+              <a:t>04.04.2016</a:t>
             </a:fld>
             <a:endParaRPr lang="ru-RU"/>
           </a:p>
@@ -15508,7 +15555,7 @@
           <a:p>
             <a:fld id="{BA1EE60E-2D75-4960-8A8D-4E97DBD789C3}" type="datetimeFigureOut">
               <a:rPr lang="ru-RU" smtClean="0"/>
-              <a:t>29.03.2016</a:t>
+              <a:t>04.04.2016</a:t>
             </a:fld>
             <a:endParaRPr lang="ru-RU"/>
           </a:p>
@@ -15678,7 +15725,7 @@
           <a:p>
             <a:fld id="{BA1EE60E-2D75-4960-8A8D-4E97DBD789C3}" type="datetimeFigureOut">
               <a:rPr lang="ru-RU" smtClean="0"/>
-              <a:t>29.03.2016</a:t>
+              <a:t>04.04.2016</a:t>
             </a:fld>
             <a:endParaRPr lang="ru-RU"/>
           </a:p>
@@ -15858,7 +15905,7 @@
           <a:p>
             <a:fld id="{BA1EE60E-2D75-4960-8A8D-4E97DBD789C3}" type="datetimeFigureOut">
               <a:rPr lang="ru-RU" smtClean="0"/>
-              <a:t>29.03.2016</a:t>
+              <a:t>04.04.2016</a:t>
             </a:fld>
             <a:endParaRPr lang="ru-RU"/>
           </a:p>
@@ -21382,7 +21429,7 @@
           <a:p>
             <a:fld id="{BA1EE60E-2D75-4960-8A8D-4E97DBD789C3}" type="datetimeFigureOut">
               <a:rPr lang="ru-RU" smtClean="0"/>
-              <a:t>29.03.2016</a:t>
+              <a:t>04.04.2016</a:t>
             </a:fld>
             <a:endParaRPr lang="ru-RU"/>
           </a:p>
@@ -36170,8 +36217,8 @@
           <a:p>
             <a:pPr algn="ctr"/>
             <a:r>
-              <a:rPr lang="ru-RU" sz="2800" dirty="0"/>
-              <a:t>Тип Архитектуры</a:t>
+              <a:rPr lang="en-US" sz="2800" dirty="0" smtClean="0"/>
+              <a:t>Architecture Type</a:t>
             </a:r>
             <a:endParaRPr lang="en-US" sz="2800" dirty="0"/>
           </a:p>
@@ -36457,8 +36504,8 @@
           <a:p>
             <a:pPr algn="ctr"/>
             <a:r>
-              <a:rPr lang="ru-RU" sz="2400" dirty="0" smtClean="0"/>
-              <a:t>Монолитное приложение</a:t>
+              <a:rPr lang="en-US" sz="2400" dirty="0" smtClean="0"/>
+              <a:t>Application as monolith</a:t>
             </a:r>
             <a:endParaRPr lang="ru-RU" sz="2400" dirty="0"/>
           </a:p>
@@ -36488,19 +36535,12 @@
           <a:p>
             <a:pPr algn="ctr"/>
             <a:r>
-              <a:rPr lang="ru-RU" sz="2400" dirty="0" err="1" smtClean="0"/>
-              <a:t>Микросервисное</a:t>
-            </a:r>
-            <a:r>
-              <a:rPr lang="ru-RU" sz="2400" dirty="0" smtClean="0"/>
-              <a:t> </a:t>
-            </a:r>
-          </a:p>
-          <a:p>
-            <a:pPr algn="ctr"/>
-            <a:r>
-              <a:rPr lang="ru-RU" sz="2400" dirty="0" smtClean="0"/>
-              <a:t>приложение</a:t>
+              <a:rPr lang="en-US" sz="2400" dirty="0" smtClean="0"/>
+              <a:t>Application as </a:t>
+            </a:r>
+            <a:r>
+              <a:rPr lang="en-US" sz="2400" dirty="0" err="1" smtClean="0"/>
+              <a:t>microservices</a:t>
             </a:r>
             <a:endParaRPr lang="ru-RU" sz="2400" dirty="0"/>
           </a:p>
@@ -51596,21 +51636,21 @@
 </file>
 
 <file path=customXml/item1.xml><?xml version="1.0" encoding="utf-8"?>
+<?mso-contentType ?>
+<FormTemplates xmlns="http://schemas.microsoft.com/sharepoint/v3/contenttype/forms">
+  <Display>DocumentLibraryForm</Display>
+  <Edit>DocumentLibraryForm</Edit>
+  <New>DocumentLibraryForm</New>
+</FormTemplates>
+</file>
+
+<file path=customXml/item2.xml><?xml version="1.0" encoding="utf-8"?>
 <p:properties xmlns:p="http://schemas.microsoft.com/office/2006/metadata/properties" xmlns:xsi="http://www.w3.org/2001/XMLSchema-instance" xmlns:pc="http://schemas.microsoft.com/office/infopath/2007/PartnerControls">
   <documentManagement>
     <PublishingExpirationDate xmlns="http://schemas.microsoft.com/sharepoint/v3" xsi:nil="true"/>
     <PublishingStartDate xmlns="http://schemas.microsoft.com/sharepoint/v3" xsi:nil="true"/>
   </documentManagement>
 </p:properties>
-</file>
-
-<file path=customXml/item2.xml><?xml version="1.0" encoding="utf-8"?>
-<?mso-contentType ?>
-<FormTemplates xmlns="http://schemas.microsoft.com/sharepoint/v3/contenttype/forms">
-  <Display>DocumentLibraryForm</Display>
-  <Edit>DocumentLibraryForm</Edit>
-  <New>DocumentLibraryForm</New>
-</FormTemplates>
 </file>
 
 <file path=customXml/item3.xml><?xml version="1.0" encoding="utf-8"?>
@@ -51746,6 +51786,14 @@
 </file>
 
 <file path=customXml/itemProps1.xml><?xml version="1.0" encoding="utf-8"?>
+<ds:datastoreItem xmlns:ds="http://schemas.openxmlformats.org/officeDocument/2006/customXml" ds:itemID="{14883F0F-DE57-4ECA-B9BB-F22E8C5B5D82}">
+  <ds:schemaRefs>
+    <ds:schemaRef ds:uri="http://schemas.microsoft.com/sharepoint/v3/contenttype/forms"/>
+  </ds:schemaRefs>
+</ds:datastoreItem>
+</file>
+
+<file path=customXml/itemProps2.xml><?xml version="1.0" encoding="utf-8"?>
 <ds:datastoreItem xmlns:ds="http://schemas.openxmlformats.org/officeDocument/2006/customXml" ds:itemID="{D5E3C081-4081-47AD-A9A6-9F18F525DA1D}">
   <ds:schemaRefs>
     <ds:schemaRef ds:uri="http://purl.org/dc/dcmitype/"/>
@@ -51757,14 +51805,6 @@
     <ds:schemaRef ds:uri="http://schemas.openxmlformats.org/package/2006/metadata/core-properties"/>
     <ds:schemaRef ds:uri="http://schemas.microsoft.com/sharepoint/v3"/>
     <ds:schemaRef ds:uri="http://schemas.microsoft.com/office/2006/metadata/properties"/>
-  </ds:schemaRefs>
-</ds:datastoreItem>
-</file>
-
-<file path=customXml/itemProps2.xml><?xml version="1.0" encoding="utf-8"?>
-<ds:datastoreItem xmlns:ds="http://schemas.openxmlformats.org/officeDocument/2006/customXml" ds:itemID="{14883F0F-DE57-4ECA-B9BB-F22E8C5B5D82}">
-  <ds:schemaRefs>
-    <ds:schemaRef ds:uri="http://schemas.microsoft.com/sharepoint/v3/contenttype/forms"/>
   </ds:schemaRefs>
 </ds:datastoreItem>
 </file>

</xml_diff>